<commit_message>
Fix date in final slide
</commit_message>
<xml_diff>
--- a/files/monthly-calls/uswds-monthly-call-august-2021-distro.pptx
+++ b/files/monthly-calls/uswds-monthly-call-august-2021-distro.pptx
@@ -300,7 +300,7 @@
       <p15:notesGuideLst xmlns:p15="http://schemas.microsoft.com/office/powerpoint/2012/main"/>
     </p:ext>
     <p:ext uri="http://customooxmlschemas.google.com/">
-      <go:slidesCustomData xmlns="" xmlns:mc="http://schemas.openxmlformats.org/markup-compatibility/2006" xmlns:mv="urn:schemas-microsoft-com:mac:vml" xmlns:c="http://schemas.openxmlformats.org/drawingml/2006/chart" xmlns:dgm="http://schemas.openxmlformats.org/drawingml/2006/diagram" xmlns:o="urn:schemas-microsoft-com:office:office" xmlns:v="urn:schemas-microsoft-com:vml" xmlns:pvml="urn:schemas-microsoft-com:office:powerpoint" xmlns:com="http://schemas.openxmlformats.org/drawingml/2006/compatibility" xmlns:p14="http://schemas.microsoft.com/office/powerpoint/2010/main" xmlns:p15="http://schemas.microsoft.com/office/powerpoint/2012/main" xmlns:ahyp="http://schemas.microsoft.com/office/drawing/2018/hyperlinkcolor" xmlns:go="http://customooxmlschemas.google.com/" r:id="rId97" roundtripDataSignature="AMtx7mhyBx7hKT3jCTSxbEAYregr5Isgag=="/>
+      <go:slidesCustomData xmlns:go="http://customooxmlschemas.google.com/" xmlns:ahyp="http://schemas.microsoft.com/office/drawing/2018/hyperlinkcolor" xmlns:p15="http://schemas.microsoft.com/office/powerpoint/2012/main" xmlns:p14="http://schemas.microsoft.com/office/powerpoint/2010/main" xmlns:com="http://schemas.openxmlformats.org/drawingml/2006/compatibility" xmlns:pvml="urn:schemas-microsoft-com:office:powerpoint" xmlns:v="urn:schemas-microsoft-com:vml" xmlns:o="urn:schemas-microsoft-com:office:office" xmlns:dgm="http://schemas.openxmlformats.org/drawingml/2006/diagram" xmlns:c="http://schemas.openxmlformats.org/drawingml/2006/chart" xmlns:mv="urn:schemas-microsoft-com:mac:vml" xmlns:mc="http://schemas.openxmlformats.org/markup-compatibility/2006" xmlns="" r:id="rId97" roundtripDataSignature="AMtx7mhyBx7hKT3jCTSxbEAYregr5Isgag=="/>
     </p:ext>
   </p:extLst>
 </p:presentation>
@@ -1377,7 +1377,20 @@
                 <a:cs typeface="Arial"/>
                 <a:sym typeface="Arial"/>
               </a:rPr>
-              <a:t>Thank you, and see you in August!</a:t>
+              <a:t>Thank you, and see you </a:t>
+            </a:r>
+            <a:r>
+              <a:rPr lang="en-US" sz="1100" b="0" i="0" u="none" strike="noStrike" cap="none">
+                <a:solidFill>
+                  <a:srgbClr val="000000"/>
+                </a:solidFill>
+                <a:effectLst/>
+                <a:latin typeface="Arial"/>
+                <a:ea typeface="Arial"/>
+                <a:cs typeface="Arial"/>
+                <a:sym typeface="Arial"/>
+              </a:rPr>
+              <a:t>in September!</a:t>
             </a:r>
             <a:endParaRPr sz="1400" dirty="0">
               <a:latin typeface="Public Sans"/>

</xml_diff>